<commit_message>
Removed 2nd fazits page lul
</commit_message>
<xml_diff>
--- a/Lua.pptx
+++ b/Lua.pptx
@@ -5,7 +5,7 @@
     <p:sldMasterId id="2147483758" r:id="rId1"/>
   </p:sldMasterIdLst>
   <p:notesMasterIdLst>
-    <p:notesMasterId r:id="rId12"/>
+    <p:notesMasterId r:id="rId11"/>
   </p:notesMasterIdLst>
   <p:sldIdLst>
     <p:sldId id="256" r:id="rId2"/>
@@ -16,8 +16,7 @@
     <p:sldId id="260" r:id="rId7"/>
     <p:sldId id="261" r:id="rId8"/>
     <p:sldId id="262" r:id="rId9"/>
-    <p:sldId id="263" r:id="rId10"/>
-    <p:sldId id="264" r:id="rId11"/>
+    <p:sldId id="264" r:id="rId10"/>
   </p:sldIdLst>
   <p:sldSz cx="12192000" cy="6858000"/>
   <p:notesSz cx="6858000" cy="9144000"/>
@@ -6297,118 +6296,6 @@
 </p:sld>
 </file>
 
-<file path=ppt/slides/slide10.xml><?xml version="1.0" encoding="utf-8"?>
-<p:sld xmlns:a="http://schemas.openxmlformats.org/drawingml/2006/main" xmlns:r="http://schemas.openxmlformats.org/officeDocument/2006/relationships" xmlns:p="http://schemas.openxmlformats.org/presentationml/2006/main">
-  <p:cSld>
-    <p:spTree>
-      <p:nvGrpSpPr>
-        <p:cNvPr id="1" name=""/>
-        <p:cNvGrpSpPr/>
-        <p:nvPr/>
-      </p:nvGrpSpPr>
-      <p:grpSpPr>
-        <a:xfrm>
-          <a:off x="0" y="0"/>
-          <a:ext cx="0" cy="0"/>
-          <a:chOff x="0" y="0"/>
-          <a:chExt cx="0" cy="0"/>
-        </a:xfrm>
-      </p:grpSpPr>
-      <p:sp>
-        <p:nvSpPr>
-          <p:cNvPr id="2" name="Titel 1">
-            <a:extLst>
-              <a:ext uri="{FF2B5EF4-FFF2-40B4-BE49-F238E27FC236}">
-                <a16:creationId xmlns:a16="http://schemas.microsoft.com/office/drawing/2014/main" id="{8F46BB6D-FF80-4678-BE12-178CCD370CB5}"/>
-              </a:ext>
-            </a:extLst>
-          </p:cNvPr>
-          <p:cNvSpPr>
-            <a:spLocks noGrp="1"/>
-          </p:cNvSpPr>
-          <p:nvPr>
-            <p:ph type="title"/>
-          </p:nvPr>
-        </p:nvSpPr>
-        <p:spPr/>
-        <p:txBody>
-          <a:bodyPr/>
-          <a:lstStyle/>
-          <a:p>
-            <a:r>
-              <a:rPr lang="de-CH" dirty="0"/>
-              <a:t>Persönliches Fazit</a:t>
-            </a:r>
-          </a:p>
-        </p:txBody>
-      </p:sp>
-      <p:sp>
-        <p:nvSpPr>
-          <p:cNvPr id="3" name="Inhaltsplatzhalter 2">
-            <a:extLst>
-              <a:ext uri="{FF2B5EF4-FFF2-40B4-BE49-F238E27FC236}">
-                <a16:creationId xmlns:a16="http://schemas.microsoft.com/office/drawing/2014/main" id="{334B0A7D-132C-41D7-BD08-557EB46A1275}"/>
-              </a:ext>
-            </a:extLst>
-          </p:cNvPr>
-          <p:cNvSpPr>
-            <a:spLocks noGrp="1"/>
-          </p:cNvSpPr>
-          <p:nvPr>
-            <p:ph idx="1"/>
-          </p:nvPr>
-        </p:nvSpPr>
-        <p:spPr/>
-        <p:txBody>
-          <a:bodyPr/>
-          <a:lstStyle/>
-          <a:p>
-            <a:endParaRPr lang="de-CH"/>
-          </a:p>
-        </p:txBody>
-      </p:sp>
-      <p:sp>
-        <p:nvSpPr>
-          <p:cNvPr id="4" name="Foliennummernplatzhalter 3">
-            <a:extLst>
-              <a:ext uri="{FF2B5EF4-FFF2-40B4-BE49-F238E27FC236}">
-                <a16:creationId xmlns:a16="http://schemas.microsoft.com/office/drawing/2014/main" id="{EC09ED78-F1CE-4032-8547-66FBBF58E2A0}"/>
-              </a:ext>
-            </a:extLst>
-          </p:cNvPr>
-          <p:cNvSpPr>
-            <a:spLocks noGrp="1"/>
-          </p:cNvSpPr>
-          <p:nvPr>
-            <p:ph type="sldNum" sz="quarter" idx="12"/>
-          </p:nvPr>
-        </p:nvSpPr>
-        <p:spPr/>
-        <p:txBody>
-          <a:bodyPr/>
-          <a:lstStyle/>
-          <a:p>
-            <a:fld id="{0CE99FAD-A252-45E6-912A-7A3B14C6A053}" type="slidenum">
-              <a:rPr lang="de-CH" smtClean="0"/>
-              <a:t>10</a:t>
-            </a:fld>
-            <a:endParaRPr lang="de-CH"/>
-          </a:p>
-        </p:txBody>
-      </p:sp>
-    </p:spTree>
-    <p:extLst>
-      <p:ext uri="{BB962C8B-B14F-4D97-AF65-F5344CB8AC3E}">
-        <p14:creationId xmlns:p14="http://schemas.microsoft.com/office/powerpoint/2010/main" val="1352414623"/>
-      </p:ext>
-    </p:extLst>
-  </p:cSld>
-  <p:clrMapOvr>
-    <a:masterClrMapping/>
-  </p:clrMapOvr>
-</p:sld>
-</file>
-
 <file path=ppt/slides/slide2.xml><?xml version="1.0" encoding="utf-8"?>
 <p:sld xmlns:a="http://schemas.openxmlformats.org/drawingml/2006/main" xmlns:r="http://schemas.openxmlformats.org/officeDocument/2006/relationships" xmlns:p="http://schemas.openxmlformats.org/presentationml/2006/main">
   <p:cSld>
@@ -7318,7 +7205,7 @@
           <p:cNvPr id="2" name="Titel 1">
             <a:extLst>
               <a:ext uri="{FF2B5EF4-FFF2-40B4-BE49-F238E27FC236}">
-                <a16:creationId xmlns:a16="http://schemas.microsoft.com/office/drawing/2014/main" id="{6176994B-2427-43BA-B909-FCE22686C822}"/>
+                <a16:creationId xmlns:a16="http://schemas.microsoft.com/office/drawing/2014/main" id="{8F46BB6D-FF80-4678-BE12-178CCD370CB5}"/>
               </a:ext>
             </a:extLst>
           </p:cNvPr>
@@ -7336,8 +7223,13 @@
           <a:p>
             <a:r>
               <a:rPr lang="de-CH" dirty="0"/>
-              <a:t>Persönliches Fazit</a:t>
-            </a:r>
+              <a:t>Persönliche </a:t>
+            </a:r>
+            <a:r>
+              <a:rPr lang="de-CH" dirty="0" err="1"/>
+              <a:t>Fazite</a:t>
+            </a:r>
+            <a:endParaRPr lang="de-CH" dirty="0"/>
           </a:p>
         </p:txBody>
       </p:sp>
@@ -7346,7 +7238,7 @@
           <p:cNvPr id="3" name="Inhaltsplatzhalter 2">
             <a:extLst>
               <a:ext uri="{FF2B5EF4-FFF2-40B4-BE49-F238E27FC236}">
-                <a16:creationId xmlns:a16="http://schemas.microsoft.com/office/drawing/2014/main" id="{F9DD5F0E-5C3C-4EFF-8E69-0EEFB5C38827}"/>
+                <a16:creationId xmlns:a16="http://schemas.microsoft.com/office/drawing/2014/main" id="{334B0A7D-132C-41D7-BD08-557EB46A1275}"/>
               </a:ext>
             </a:extLst>
           </p:cNvPr>
@@ -7371,7 +7263,7 @@
           <p:cNvPr id="4" name="Foliennummernplatzhalter 3">
             <a:extLst>
               <a:ext uri="{FF2B5EF4-FFF2-40B4-BE49-F238E27FC236}">
-                <a16:creationId xmlns:a16="http://schemas.microsoft.com/office/drawing/2014/main" id="{BF0E9832-CB94-4729-AA32-C139D4A1FD20}"/>
+                <a16:creationId xmlns:a16="http://schemas.microsoft.com/office/drawing/2014/main" id="{EC09ED78-F1CE-4032-8547-66FBBF58E2A0}"/>
               </a:ext>
             </a:extLst>
           </p:cNvPr>
@@ -7398,7 +7290,7 @@
     </p:spTree>
     <p:extLst>
       <p:ext uri="{BB962C8B-B14F-4D97-AF65-F5344CB8AC3E}">
-        <p14:creationId xmlns:p14="http://schemas.microsoft.com/office/powerpoint/2010/main" val="3617008818"/>
+        <p14:creationId xmlns:p14="http://schemas.microsoft.com/office/powerpoint/2010/main" val="1352414623"/>
       </p:ext>
     </p:extLst>
   </p:cSld>

</xml_diff>